<commit_message>
voidcallback and fix navigate and change main UI
</commit_message>
<xml_diff>
--- a/documents/WISSFLUTTER01_DOC_REV1.pptx
+++ b/documents/WISSFLUTTER01_DOC_REV1.pptx
@@ -5,10 +5,10 @@
     <p:sldMasterId id="2147483648" r:id="rId1"/>
   </p:sldMasterIdLst>
   <p:notesMasterIdLst>
-    <p:notesMasterId r:id="rId10"/>
+    <p:notesMasterId r:id="rId12"/>
   </p:notesMasterIdLst>
   <p:handoutMasterIdLst>
-    <p:handoutMasterId r:id="rId11"/>
+    <p:handoutMasterId r:id="rId13"/>
   </p:handoutMasterIdLst>
   <p:sldIdLst>
     <p:sldId id="477" r:id="rId2"/>
@@ -16,9 +16,11 @@
     <p:sldId id="484" r:id="rId4"/>
     <p:sldId id="482" r:id="rId5"/>
     <p:sldId id="483" r:id="rId6"/>
-    <p:sldId id="480" r:id="rId7"/>
-    <p:sldId id="481" r:id="rId8"/>
-    <p:sldId id="479" r:id="rId9"/>
+    <p:sldId id="485" r:id="rId7"/>
+    <p:sldId id="486" r:id="rId8"/>
+    <p:sldId id="480" r:id="rId9"/>
+    <p:sldId id="481" r:id="rId10"/>
+    <p:sldId id="479" r:id="rId11"/>
   </p:sldIdLst>
   <p:sldSz cx="12192000" cy="6858000"/>
   <p:notesSz cx="6858000" cy="9144000"/>
@@ -4376,6 +4378,122 @@
 </p:sld>
 </file>
 
+<file path=ppt/slides/slide10.xml><?xml version="1.0" encoding="utf-8"?>
+<p:sld xmlns:a="http://schemas.openxmlformats.org/drawingml/2006/main" xmlns:r="http://schemas.openxmlformats.org/officeDocument/2006/relationships" xmlns:p="http://schemas.openxmlformats.org/presentationml/2006/main">
+  <p:cSld>
+    <p:spTree>
+      <p:nvGrpSpPr>
+        <p:cNvPr id="1" name=""/>
+        <p:cNvGrpSpPr/>
+        <p:nvPr/>
+      </p:nvGrpSpPr>
+      <p:grpSpPr>
+        <a:xfrm>
+          <a:off x="0" y="0"/>
+          <a:ext cx="0" cy="0"/>
+          <a:chOff x="0" y="0"/>
+          <a:chExt cx="0" cy="0"/>
+        </a:xfrm>
+      </p:grpSpPr>
+      <p:sp>
+        <p:nvSpPr>
+          <p:cNvPr id="2" name="Title 1">
+            <a:extLst>
+              <a:ext uri="{FF2B5EF4-FFF2-40B4-BE49-F238E27FC236}">
+                <a16:creationId xmlns:a16="http://schemas.microsoft.com/office/drawing/2014/main" id="{F8BAF344-D23D-4773-B8FE-8B734F6B1229}"/>
+              </a:ext>
+            </a:extLst>
+          </p:cNvPr>
+          <p:cNvSpPr>
+            <a:spLocks noGrp="1"/>
+          </p:cNvSpPr>
+          <p:nvPr>
+            <p:ph type="title"/>
+          </p:nvPr>
+        </p:nvSpPr>
+        <p:spPr/>
+        <p:txBody>
+          <a:bodyPr/>
+          <a:lstStyle/>
+          <a:p>
+            <a:r>
+              <a:rPr lang="en-US" dirty="0"/>
+              <a:t>Tasks</a:t>
+            </a:r>
+            <a:endParaRPr lang="th-TH" dirty="0"/>
+          </a:p>
+        </p:txBody>
+      </p:sp>
+      <p:sp>
+        <p:nvSpPr>
+          <p:cNvPr id="3" name="TextBox 2">
+            <a:extLst>
+              <a:ext uri="{FF2B5EF4-FFF2-40B4-BE49-F238E27FC236}">
+                <a16:creationId xmlns:a16="http://schemas.microsoft.com/office/drawing/2014/main" id="{A93BDF4F-7E57-43FD-A7BC-06058D4BFA73}"/>
+              </a:ext>
+            </a:extLst>
+          </p:cNvPr>
+          <p:cNvSpPr txBox="1"/>
+          <p:nvPr/>
+        </p:nvSpPr>
+        <p:spPr>
+          <a:xfrm>
+            <a:off x="933450" y="762000"/>
+            <a:ext cx="5829300" cy="1384995"/>
+          </a:xfrm>
+          <a:prstGeom prst="rect">
+            <a:avLst/>
+          </a:prstGeom>
+          <a:noFill/>
+        </p:spPr>
+        <p:txBody>
+          <a:bodyPr wrap="square" rtlCol="0">
+            <a:spAutoFit/>
+          </a:bodyPr>
+          <a:lstStyle/>
+          <a:p>
+            <a:pPr marL="514350" indent="-514350">
+              <a:buAutoNum type="arabicPeriod"/>
+            </a:pPr>
+            <a:r>
+              <a:rPr lang="en-US" dirty="0"/>
+              <a:t>Upload to web</a:t>
+            </a:r>
+          </a:p>
+          <a:p>
+            <a:pPr marL="514350" indent="-514350">
+              <a:buAutoNum type="arabicPeriod"/>
+            </a:pPr>
+            <a:r>
+              <a:rPr lang="en-US" dirty="0"/>
+              <a:t>Call api</a:t>
+            </a:r>
+          </a:p>
+          <a:p>
+            <a:pPr marL="514350" indent="-514350">
+              <a:buAutoNum type="arabicPeriod"/>
+            </a:pPr>
+            <a:r>
+              <a:rPr lang="en-US" dirty="0"/>
+              <a:t>Run on Android studio</a:t>
+            </a:r>
+            <a:endParaRPr lang="th-TH" dirty="0"/>
+          </a:p>
+        </p:txBody>
+      </p:sp>
+    </p:spTree>
+    <p:extLst>
+      <p:ext uri="{BB962C8B-B14F-4D97-AF65-F5344CB8AC3E}">
+        <p14:creationId xmlns:p14="http://schemas.microsoft.com/office/powerpoint/2010/main" val="3240568446"/>
+      </p:ext>
+    </p:extLst>
+  </p:cSld>
+  <p:clrMapOvr>
+    <a:masterClrMapping/>
+  </p:clrMapOvr>
+</p:sld>
+</file>
+
 <file path=ppt/slides/slide2.xml><?xml version="1.0" encoding="utf-8"?>
 <p:sld xmlns:a="http://schemas.openxmlformats.org/drawingml/2006/main" xmlns:r="http://schemas.openxmlformats.org/officeDocument/2006/relationships" xmlns:p="http://schemas.openxmlformats.org/presentationml/2006/main">
   <p:cSld>
@@ -5603,7 +5721,7 @@
           <p:cNvPr id="2" name="Title 1">
             <a:extLst>
               <a:ext uri="{FF2B5EF4-FFF2-40B4-BE49-F238E27FC236}">
-                <a16:creationId xmlns:a16="http://schemas.microsoft.com/office/drawing/2014/main" id="{53C51CB8-3B93-4212-9C3A-99955B444385}"/>
+                <a16:creationId xmlns:a16="http://schemas.microsoft.com/office/drawing/2014/main" id="{A49E5345-C666-4C4F-99B4-A20BC35DC441}"/>
               </a:ext>
             </a:extLst>
           </p:cNvPr>
@@ -5621,7 +5739,7 @@
           <a:p>
             <a:r>
               <a:rPr lang="en-US" dirty="0"/>
-              <a:t>Flutter DataTable</a:t>
+              <a:t>Data Table</a:t>
             </a:r>
             <a:endParaRPr lang="th-TH" dirty="0"/>
           </a:p>
@@ -5632,7 +5750,7 @@
           <p:cNvPr id="4" name="Picture 3">
             <a:extLst>
               <a:ext uri="{FF2B5EF4-FFF2-40B4-BE49-F238E27FC236}">
-                <a16:creationId xmlns:a16="http://schemas.microsoft.com/office/drawing/2014/main" id="{D90127B9-06CD-4740-9130-6725A3439D31}"/>
+                <a16:creationId xmlns:a16="http://schemas.microsoft.com/office/drawing/2014/main" id="{BFB7CEDD-883A-42C0-B0FF-686BFBDBC147}"/>
               </a:ext>
             </a:extLst>
           </p:cNvPr>
@@ -5649,8 +5767,8 @@
         </p:blipFill>
         <p:spPr>
           <a:xfrm>
-            <a:off x="838200" y="904577"/>
-            <a:ext cx="2143424" cy="4267796"/>
+            <a:off x="486720" y="777160"/>
+            <a:ext cx="2908470" cy="5303680"/>
           </a:xfrm>
           <a:prstGeom prst="rect">
             <a:avLst/>
@@ -5662,7 +5780,7 @@
           <p:cNvPr id="6" name="Picture 5">
             <a:extLst>
               <a:ext uri="{FF2B5EF4-FFF2-40B4-BE49-F238E27FC236}">
-                <a16:creationId xmlns:a16="http://schemas.microsoft.com/office/drawing/2014/main" id="{505EF67B-242D-4316-8576-7880DB1E55BD}"/>
+                <a16:creationId xmlns:a16="http://schemas.microsoft.com/office/drawing/2014/main" id="{D46AD50E-F8E9-4137-A80D-5651B61395A9}"/>
               </a:ext>
             </a:extLst>
           </p:cNvPr>
@@ -5679,18 +5797,152 @@
         </p:blipFill>
         <p:spPr>
           <a:xfrm>
-            <a:off x="3328816" y="904577"/>
-            <a:ext cx="2790900" cy="4267795"/>
+            <a:off x="7970133" y="777160"/>
+            <a:ext cx="3989736" cy="5303680"/>
           </a:xfrm>
           <a:prstGeom prst="rect">
             <a:avLst/>
           </a:prstGeom>
         </p:spPr>
       </p:pic>
+      <p:pic>
+        <p:nvPicPr>
+          <p:cNvPr id="8" name="Picture 7">
+            <a:extLst>
+              <a:ext uri="{FF2B5EF4-FFF2-40B4-BE49-F238E27FC236}">
+                <a16:creationId xmlns:a16="http://schemas.microsoft.com/office/drawing/2014/main" id="{7CD56F15-D8A8-401F-9222-EC092246D7EA}"/>
+              </a:ext>
+            </a:extLst>
+          </p:cNvPr>
+          <p:cNvPicPr>
+            <a:picLocks noChangeAspect="1"/>
+          </p:cNvPicPr>
+          <p:nvPr/>
+        </p:nvPicPr>
+        <p:blipFill>
+          <a:blip r:embed="rId4"/>
+          <a:stretch>
+            <a:fillRect/>
+          </a:stretch>
+        </p:blipFill>
+        <p:spPr>
+          <a:xfrm>
+            <a:off x="3763963" y="777159"/>
+            <a:ext cx="3958695" cy="5303681"/>
+          </a:xfrm>
+          <a:prstGeom prst="rect">
+            <a:avLst/>
+          </a:prstGeom>
+        </p:spPr>
+      </p:pic>
+      <p:sp>
+        <p:nvSpPr>
+          <p:cNvPr id="9" name="Rectangle: Rounded Corners 8">
+            <a:extLst>
+              <a:ext uri="{FF2B5EF4-FFF2-40B4-BE49-F238E27FC236}">
+                <a16:creationId xmlns:a16="http://schemas.microsoft.com/office/drawing/2014/main" id="{ADEC3E32-8F03-46D7-91E1-2A2CDCC167BB}"/>
+              </a:ext>
+            </a:extLst>
+          </p:cNvPr>
+          <p:cNvSpPr/>
+          <p:nvPr/>
+        </p:nvSpPr>
+        <p:spPr>
+          <a:xfrm>
+            <a:off x="3718124" y="6080840"/>
+            <a:ext cx="4004534" cy="447586"/>
+          </a:xfrm>
+          <a:prstGeom prst="roundRect">
+            <a:avLst/>
+          </a:prstGeom>
+        </p:spPr>
+        <p:style>
+          <a:lnRef idx="2">
+            <a:schemeClr val="accent1">
+              <a:shade val="50000"/>
+            </a:schemeClr>
+          </a:lnRef>
+          <a:fillRef idx="1">
+            <a:schemeClr val="accent1"/>
+          </a:fillRef>
+          <a:effectRef idx="0">
+            <a:schemeClr val="accent1"/>
+          </a:effectRef>
+          <a:fontRef idx="minor">
+            <a:schemeClr val="lt1"/>
+          </a:fontRef>
+        </p:style>
+        <p:txBody>
+          <a:bodyPr rtlCol="0" anchor="ctr"/>
+          <a:lstStyle/>
+          <a:p>
+            <a:pPr algn="ctr"/>
+            <a:r>
+              <a:rPr lang="en-US" dirty="0"/>
+              <a:t>Data Table</a:t>
+            </a:r>
+            <a:endParaRPr lang="th-TH" dirty="0"/>
+          </a:p>
+        </p:txBody>
+      </p:sp>
+      <p:sp>
+        <p:nvSpPr>
+          <p:cNvPr id="10" name="Rectangle: Rounded Corners 9">
+            <a:extLst>
+              <a:ext uri="{FF2B5EF4-FFF2-40B4-BE49-F238E27FC236}">
+                <a16:creationId xmlns:a16="http://schemas.microsoft.com/office/drawing/2014/main" id="{E7A63906-A909-4712-ACDD-9502E3CA09EE}"/>
+              </a:ext>
+            </a:extLst>
+          </p:cNvPr>
+          <p:cNvSpPr/>
+          <p:nvPr/>
+        </p:nvSpPr>
+        <p:spPr>
+          <a:xfrm>
+            <a:off x="7970133" y="6080840"/>
+            <a:ext cx="4004534" cy="447586"/>
+          </a:xfrm>
+          <a:prstGeom prst="roundRect">
+            <a:avLst/>
+          </a:prstGeom>
+        </p:spPr>
+        <p:style>
+          <a:lnRef idx="2">
+            <a:schemeClr val="accent1">
+              <a:shade val="50000"/>
+            </a:schemeClr>
+          </a:lnRef>
+          <a:fillRef idx="1">
+            <a:schemeClr val="accent1"/>
+          </a:fillRef>
+          <a:effectRef idx="0">
+            <a:schemeClr val="accent1"/>
+          </a:effectRef>
+          <a:fontRef idx="minor">
+            <a:schemeClr val="lt1"/>
+          </a:fontRef>
+        </p:style>
+        <p:txBody>
+          <a:bodyPr rtlCol="0" anchor="ctr"/>
+          <a:lstStyle/>
+          <a:p>
+            <a:pPr algn="ctr"/>
+            <a:r>
+              <a:rPr lang="en-US" dirty="0"/>
+              <a:t>Data Table with </a:t>
+            </a:r>
+            <a:r>
+              <a:rPr lang="en-US" dirty="0" err="1"/>
+              <a:t>Checkedbox</a:t>
+            </a:r>
+            <a:endParaRPr lang="th-TH" dirty="0"/>
+          </a:p>
+        </p:txBody>
+      </p:sp>
     </p:spTree>
     <p:extLst>
       <p:ext uri="{BB962C8B-B14F-4D97-AF65-F5344CB8AC3E}">
-        <p14:creationId xmlns:p14="http://schemas.microsoft.com/office/powerpoint/2010/main" val="2248180005"/>
+        <p14:creationId xmlns:p14="http://schemas.microsoft.com/office/powerpoint/2010/main" val="1671468823"/>
       </p:ext>
     </p:extLst>
   </p:cSld>
@@ -5722,7 +5974,7 @@
           <p:cNvPr id="2" name="Title 1">
             <a:extLst>
               <a:ext uri="{FF2B5EF4-FFF2-40B4-BE49-F238E27FC236}">
-                <a16:creationId xmlns:a16="http://schemas.microsoft.com/office/drawing/2014/main" id="{53C51CB8-3B93-4212-9C3A-99955B444385}"/>
+                <a16:creationId xmlns:a16="http://schemas.microsoft.com/office/drawing/2014/main" id="{BD636F7E-C866-4700-99C9-7B76D1452E8B}"/>
               </a:ext>
             </a:extLst>
           </p:cNvPr>
@@ -5740,7 +5992,7 @@
           <a:p>
             <a:r>
               <a:rPr lang="en-US" dirty="0"/>
-              <a:t>Search Parameter</a:t>
+              <a:t>Void call Back</a:t>
             </a:r>
             <a:endParaRPr lang="th-TH" dirty="0"/>
           </a:p>
@@ -5748,10 +6000,10 @@
       </p:sp>
       <p:pic>
         <p:nvPicPr>
-          <p:cNvPr id="5" name="Picture 4">
-            <a:extLst>
-              <a:ext uri="{FF2B5EF4-FFF2-40B4-BE49-F238E27FC236}">
-                <a16:creationId xmlns:a16="http://schemas.microsoft.com/office/drawing/2014/main" id="{B8DD4489-5BF7-49BC-837B-CEBDD0E7762D}"/>
+          <p:cNvPr id="4" name="Picture 3">
+            <a:extLst>
+              <a:ext uri="{FF2B5EF4-FFF2-40B4-BE49-F238E27FC236}">
+                <a16:creationId xmlns:a16="http://schemas.microsoft.com/office/drawing/2014/main" id="{0E0944DC-BB3D-4D36-9B44-4B88BBE7F65E}"/>
               </a:ext>
             </a:extLst>
           </p:cNvPr>
@@ -5768,20 +6020,402 @@
         </p:blipFill>
         <p:spPr>
           <a:xfrm>
-            <a:off x="961486" y="723900"/>
-            <a:ext cx="2324863" cy="4739145"/>
+            <a:off x="265721" y="805105"/>
+            <a:ext cx="2877820" cy="5247789"/>
           </a:xfrm>
           <a:prstGeom prst="rect">
             <a:avLst/>
           </a:prstGeom>
         </p:spPr>
       </p:pic>
+      <p:sp>
+        <p:nvSpPr>
+          <p:cNvPr id="5" name="Rectangle: Rounded Corners 4">
+            <a:extLst>
+              <a:ext uri="{FF2B5EF4-FFF2-40B4-BE49-F238E27FC236}">
+                <a16:creationId xmlns:a16="http://schemas.microsoft.com/office/drawing/2014/main" id="{CDFA09AB-B888-41F6-A4E0-61AA699F0EDF}"/>
+              </a:ext>
+            </a:extLst>
+          </p:cNvPr>
+          <p:cNvSpPr/>
+          <p:nvPr/>
+        </p:nvSpPr>
+        <p:spPr>
+          <a:xfrm>
+            <a:off x="265722" y="2002333"/>
+            <a:ext cx="2877820" cy="600075"/>
+          </a:xfrm>
+          <a:prstGeom prst="roundRect">
+            <a:avLst>
+              <a:gd name="adj" fmla="val 0"/>
+            </a:avLst>
+          </a:prstGeom>
+          <a:noFill/>
+          <a:ln w="31750">
+            <a:solidFill>
+              <a:srgbClr val="FF0000"/>
+            </a:solidFill>
+            <a:prstDash val="sysDash"/>
+          </a:ln>
+        </p:spPr>
+        <p:style>
+          <a:lnRef idx="2">
+            <a:schemeClr val="accent1">
+              <a:shade val="50000"/>
+            </a:schemeClr>
+          </a:lnRef>
+          <a:fillRef idx="1">
+            <a:schemeClr val="accent1"/>
+          </a:fillRef>
+          <a:effectRef idx="0">
+            <a:schemeClr val="accent1"/>
+          </a:effectRef>
+          <a:fontRef idx="minor">
+            <a:schemeClr val="lt1"/>
+          </a:fontRef>
+        </p:style>
+        <p:txBody>
+          <a:bodyPr rtlCol="0" anchor="ctr"/>
+          <a:lstStyle/>
+          <a:p>
+            <a:pPr algn="ctr"/>
+            <a:endParaRPr lang="th-TH"/>
+          </a:p>
+        </p:txBody>
+      </p:sp>
+      <p:sp>
+        <p:nvSpPr>
+          <p:cNvPr id="6" name="Speech Bubble: Rectangle 5">
+            <a:extLst>
+              <a:ext uri="{FF2B5EF4-FFF2-40B4-BE49-F238E27FC236}">
+                <a16:creationId xmlns:a16="http://schemas.microsoft.com/office/drawing/2014/main" id="{1CC6A0B1-6DA9-4873-A685-6DED46063C26}"/>
+              </a:ext>
+            </a:extLst>
+          </p:cNvPr>
+          <p:cNvSpPr/>
+          <p:nvPr/>
+        </p:nvSpPr>
+        <p:spPr>
+          <a:xfrm>
+            <a:off x="3256384" y="1315616"/>
+            <a:ext cx="2127379" cy="933062"/>
+          </a:xfrm>
+          <a:prstGeom prst="wedgeRectCallout">
+            <a:avLst>
+              <a:gd name="adj1" fmla="val -58283"/>
+              <a:gd name="adj2" fmla="val 38243"/>
+            </a:avLst>
+          </a:prstGeom>
+        </p:spPr>
+        <p:style>
+          <a:lnRef idx="2">
+            <a:schemeClr val="accent1">
+              <a:shade val="50000"/>
+            </a:schemeClr>
+          </a:lnRef>
+          <a:fillRef idx="1">
+            <a:schemeClr val="accent1"/>
+          </a:fillRef>
+          <a:effectRef idx="0">
+            <a:schemeClr val="accent1"/>
+          </a:effectRef>
+          <a:fontRef idx="minor">
+            <a:schemeClr val="lt1"/>
+          </a:fontRef>
+        </p:style>
+        <p:txBody>
+          <a:bodyPr rtlCol="0" anchor="ctr"/>
+          <a:lstStyle/>
+          <a:p>
+            <a:pPr algn="ctr"/>
+            <a:r>
+              <a:rPr lang="en-US" sz="1800" dirty="0"/>
+              <a:t>Build Card (Class)</a:t>
+            </a:r>
+          </a:p>
+          <a:p>
+            <a:pPr algn="ctr"/>
+            <a:r>
+              <a:rPr lang="en-US" sz="1800" dirty="0"/>
+              <a:t>onTap (Void Call Back)</a:t>
+            </a:r>
+            <a:endParaRPr lang="th-TH" sz="1800" dirty="0"/>
+          </a:p>
+        </p:txBody>
+      </p:sp>
+      <p:sp>
+        <p:nvSpPr>
+          <p:cNvPr id="7" name="Speech Bubble: Rectangle 6">
+            <a:extLst>
+              <a:ext uri="{FF2B5EF4-FFF2-40B4-BE49-F238E27FC236}">
+                <a16:creationId xmlns:a16="http://schemas.microsoft.com/office/drawing/2014/main" id="{58D20C9A-22B9-4129-92DE-F1B3B3D77966}"/>
+              </a:ext>
+            </a:extLst>
+          </p:cNvPr>
+          <p:cNvSpPr/>
+          <p:nvPr/>
+        </p:nvSpPr>
+        <p:spPr>
+          <a:xfrm>
+            <a:off x="3256384" y="2869948"/>
+            <a:ext cx="2127379" cy="616591"/>
+          </a:xfrm>
+          <a:prstGeom prst="wedgeRectCallout">
+            <a:avLst>
+              <a:gd name="adj1" fmla="val 34065"/>
+              <a:gd name="adj2" fmla="val 16897"/>
+            </a:avLst>
+          </a:prstGeom>
+        </p:spPr>
+        <p:style>
+          <a:lnRef idx="2">
+            <a:schemeClr val="accent1">
+              <a:shade val="50000"/>
+            </a:schemeClr>
+          </a:lnRef>
+          <a:fillRef idx="1">
+            <a:schemeClr val="accent1"/>
+          </a:fillRef>
+          <a:effectRef idx="0">
+            <a:schemeClr val="accent1"/>
+          </a:effectRef>
+          <a:fontRef idx="minor">
+            <a:schemeClr val="lt1"/>
+          </a:fontRef>
+        </p:style>
+        <p:txBody>
+          <a:bodyPr rtlCol="0" anchor="ctr"/>
+          <a:lstStyle/>
+          <a:p>
+            <a:pPr algn="ctr"/>
+            <a:r>
+              <a:rPr lang="en-US" sz="1800" dirty="0"/>
+              <a:t>BuildCard (onTap: </a:t>
+            </a:r>
+            <a:endParaRPr lang="th-TH" sz="1800" dirty="0"/>
+          </a:p>
+        </p:txBody>
+      </p:sp>
+      <p:sp>
+        <p:nvSpPr>
+          <p:cNvPr id="8" name="Speech Bubble: Rectangle 7">
+            <a:extLst>
+              <a:ext uri="{FF2B5EF4-FFF2-40B4-BE49-F238E27FC236}">
+                <a16:creationId xmlns:a16="http://schemas.microsoft.com/office/drawing/2014/main" id="{7816184D-11FB-404B-A896-10B57D863C14}"/>
+              </a:ext>
+            </a:extLst>
+          </p:cNvPr>
+          <p:cNvSpPr/>
+          <p:nvPr/>
+        </p:nvSpPr>
+        <p:spPr>
+          <a:xfrm>
+            <a:off x="3256384" y="4182701"/>
+            <a:ext cx="2127379" cy="616591"/>
+          </a:xfrm>
+          <a:prstGeom prst="wedgeRectCallout">
+            <a:avLst>
+              <a:gd name="adj1" fmla="val 34065"/>
+              <a:gd name="adj2" fmla="val 16897"/>
+            </a:avLst>
+          </a:prstGeom>
+        </p:spPr>
+        <p:style>
+          <a:lnRef idx="2">
+            <a:schemeClr val="accent1">
+              <a:shade val="50000"/>
+            </a:schemeClr>
+          </a:lnRef>
+          <a:fillRef idx="1">
+            <a:schemeClr val="accent1"/>
+          </a:fillRef>
+          <a:effectRef idx="0">
+            <a:schemeClr val="accent1"/>
+          </a:effectRef>
+          <a:fontRef idx="minor">
+            <a:schemeClr val="lt1"/>
+          </a:fontRef>
+        </p:style>
+        <p:txBody>
+          <a:bodyPr rtlCol="0" anchor="ctr"/>
+          <a:lstStyle/>
+          <a:p>
+            <a:pPr algn="ctr"/>
+            <a:r>
+              <a:rPr lang="en-US" sz="1800" dirty="0"/>
+              <a:t>Class BuildCard (onTap)</a:t>
+            </a:r>
+            <a:endParaRPr lang="th-TH" sz="1800" dirty="0"/>
+          </a:p>
+        </p:txBody>
+      </p:sp>
+      <p:cxnSp>
+        <p:nvCxnSpPr>
+          <p:cNvPr id="10" name="Straight Arrow Connector 9">
+            <a:extLst>
+              <a:ext uri="{FF2B5EF4-FFF2-40B4-BE49-F238E27FC236}">
+                <a16:creationId xmlns:a16="http://schemas.microsoft.com/office/drawing/2014/main" id="{0FAA40DB-6B64-418B-8A3F-39762D3B030E}"/>
+              </a:ext>
+            </a:extLst>
+          </p:cNvPr>
+          <p:cNvCxnSpPr>
+            <a:stCxn id="8" idx="0"/>
+            <a:endCxn id="7" idx="2"/>
+          </p:cNvCxnSpPr>
+          <p:nvPr/>
+        </p:nvCxnSpPr>
+        <p:spPr>
+          <a:xfrm flipV="1">
+            <a:off x="4320074" y="3486539"/>
+            <a:ext cx="0" cy="696162"/>
+          </a:xfrm>
+          <a:prstGeom prst="straightConnector1">
+            <a:avLst/>
+          </a:prstGeom>
+          <a:ln>
+            <a:tailEnd type="triangle"/>
+          </a:ln>
+        </p:spPr>
+        <p:style>
+          <a:lnRef idx="1">
+            <a:schemeClr val="accent1"/>
+          </a:lnRef>
+          <a:fillRef idx="0">
+            <a:schemeClr val="accent1"/>
+          </a:fillRef>
+          <a:effectRef idx="0">
+            <a:schemeClr val="accent1"/>
+          </a:effectRef>
+          <a:fontRef idx="minor">
+            <a:schemeClr val="tx1"/>
+          </a:fontRef>
+        </p:style>
+      </p:cxnSp>
+      <p:cxnSp>
+        <p:nvCxnSpPr>
+          <p:cNvPr id="11" name="Straight Arrow Connector 10">
+            <a:extLst>
+              <a:ext uri="{FF2B5EF4-FFF2-40B4-BE49-F238E27FC236}">
+                <a16:creationId xmlns:a16="http://schemas.microsoft.com/office/drawing/2014/main" id="{FF27ACD3-F4A0-471E-910F-546B457DED6E}"/>
+              </a:ext>
+            </a:extLst>
+          </p:cNvPr>
+          <p:cNvCxnSpPr>
+            <a:cxnSpLocks/>
+          </p:cNvCxnSpPr>
+          <p:nvPr/>
+        </p:nvCxnSpPr>
+        <p:spPr>
+          <a:xfrm>
+            <a:off x="4083175" y="3486539"/>
+            <a:ext cx="0" cy="696162"/>
+          </a:xfrm>
+          <a:prstGeom prst="straightConnector1">
+            <a:avLst/>
+          </a:prstGeom>
+          <a:ln>
+            <a:tailEnd type="triangle"/>
+          </a:ln>
+        </p:spPr>
+        <p:style>
+          <a:lnRef idx="1">
+            <a:schemeClr val="accent1"/>
+          </a:lnRef>
+          <a:fillRef idx="0">
+            <a:schemeClr val="accent1"/>
+          </a:fillRef>
+          <a:effectRef idx="0">
+            <a:schemeClr val="accent1"/>
+          </a:effectRef>
+          <a:fontRef idx="minor">
+            <a:schemeClr val="tx1"/>
+          </a:fontRef>
+        </p:style>
+      </p:cxnSp>
+      <p:sp>
+        <p:nvSpPr>
+          <p:cNvPr id="14" name="TextBox 13">
+            <a:extLst>
+              <a:ext uri="{FF2B5EF4-FFF2-40B4-BE49-F238E27FC236}">
+                <a16:creationId xmlns:a16="http://schemas.microsoft.com/office/drawing/2014/main" id="{ADF58043-3146-429E-93D5-DFB913BDB1AB}"/>
+              </a:ext>
+            </a:extLst>
+          </p:cNvPr>
+          <p:cNvSpPr txBox="1"/>
+          <p:nvPr/>
+        </p:nvSpPr>
+        <p:spPr>
+          <a:xfrm>
+            <a:off x="3256383" y="3639493"/>
+            <a:ext cx="939633" cy="523220"/>
+          </a:xfrm>
+          <a:prstGeom prst="rect">
+            <a:avLst/>
+          </a:prstGeom>
+          <a:noFill/>
+        </p:spPr>
+        <p:txBody>
+          <a:bodyPr wrap="square" rtlCol="0">
+            <a:spAutoFit/>
+          </a:bodyPr>
+          <a:lstStyle/>
+          <a:p>
+            <a:r>
+              <a:rPr lang="en-US" dirty="0"/>
+              <a:t>Param</a:t>
+            </a:r>
+            <a:endParaRPr lang="th-TH" dirty="0"/>
+          </a:p>
+        </p:txBody>
+      </p:sp>
+      <p:sp>
+        <p:nvSpPr>
+          <p:cNvPr id="15" name="TextBox 14">
+            <a:extLst>
+              <a:ext uri="{FF2B5EF4-FFF2-40B4-BE49-F238E27FC236}">
+                <a16:creationId xmlns:a16="http://schemas.microsoft.com/office/drawing/2014/main" id="{F5CCE7B9-5F7A-41DE-B2FF-28FFEFE10158}"/>
+              </a:ext>
+            </a:extLst>
+          </p:cNvPr>
+          <p:cNvSpPr txBox="1"/>
+          <p:nvPr/>
+        </p:nvSpPr>
+        <p:spPr>
+          <a:xfrm>
+            <a:off x="4308858" y="3577938"/>
+            <a:ext cx="2127376" cy="584775"/>
+          </a:xfrm>
+          <a:prstGeom prst="rect">
+            <a:avLst/>
+          </a:prstGeom>
+          <a:noFill/>
+        </p:spPr>
+        <p:txBody>
+          <a:bodyPr wrap="square" rtlCol="0">
+            <a:spAutoFit/>
+          </a:bodyPr>
+          <a:lstStyle/>
+          <a:p>
+            <a:r>
+              <a:rPr lang="en-US" sz="1600" dirty="0"/>
+              <a:t>onTap</a:t>
+            </a:r>
+          </a:p>
+          <a:p>
+            <a:r>
+              <a:rPr lang="en-US" sz="1600" dirty="0"/>
+              <a:t>(Void Call Back)</a:t>
+            </a:r>
+            <a:endParaRPr lang="th-TH" sz="1600" dirty="0"/>
+          </a:p>
+        </p:txBody>
+      </p:sp>
       <p:pic>
         <p:nvPicPr>
-          <p:cNvPr id="8" name="Picture 7">
-            <a:extLst>
-              <a:ext uri="{FF2B5EF4-FFF2-40B4-BE49-F238E27FC236}">
-                <a16:creationId xmlns:a16="http://schemas.microsoft.com/office/drawing/2014/main" id="{92BBB1AC-3D77-48A2-B5B7-8CC4986DED1B}"/>
+          <p:cNvPr id="17" name="Picture 16">
+            <a:extLst>
+              <a:ext uri="{FF2B5EF4-FFF2-40B4-BE49-F238E27FC236}">
+                <a16:creationId xmlns:a16="http://schemas.microsoft.com/office/drawing/2014/main" id="{7020D563-931A-47C8-A5EF-F8031354D166}"/>
               </a:ext>
             </a:extLst>
           </p:cNvPr>
@@ -5798,20 +6432,73 @@
         </p:blipFill>
         <p:spPr>
           <a:xfrm>
-            <a:off x="3580247" y="723900"/>
-            <a:ext cx="2339760" cy="4672452"/>
+            <a:off x="5578149" y="679009"/>
+            <a:ext cx="3470311" cy="4739489"/>
           </a:xfrm>
           <a:prstGeom prst="rect">
             <a:avLst/>
           </a:prstGeom>
         </p:spPr>
       </p:pic>
+      <p:sp>
+        <p:nvSpPr>
+          <p:cNvPr id="18" name="Speech Bubble: Rectangle 17">
+            <a:extLst>
+              <a:ext uri="{FF2B5EF4-FFF2-40B4-BE49-F238E27FC236}">
+                <a16:creationId xmlns:a16="http://schemas.microsoft.com/office/drawing/2014/main" id="{26910DB8-9B07-4AA3-8E38-9DABD7BC7EC5}"/>
+              </a:ext>
+            </a:extLst>
+          </p:cNvPr>
+          <p:cNvSpPr/>
+          <p:nvPr/>
+        </p:nvSpPr>
+        <p:spPr>
+          <a:xfrm>
+            <a:off x="5578149" y="5509898"/>
+            <a:ext cx="3470311" cy="474444"/>
+          </a:xfrm>
+          <a:prstGeom prst="wedgeRectCallout">
+            <a:avLst>
+              <a:gd name="adj1" fmla="val 34065"/>
+              <a:gd name="adj2" fmla="val 16897"/>
+            </a:avLst>
+          </a:prstGeom>
+        </p:spPr>
+        <p:style>
+          <a:lnRef idx="2">
+            <a:schemeClr val="accent1">
+              <a:shade val="50000"/>
+            </a:schemeClr>
+          </a:lnRef>
+          <a:fillRef idx="1">
+            <a:schemeClr val="accent1"/>
+          </a:fillRef>
+          <a:effectRef idx="0">
+            <a:schemeClr val="accent1"/>
+          </a:effectRef>
+          <a:fontRef idx="minor">
+            <a:schemeClr val="lt1"/>
+          </a:fontRef>
+        </p:style>
+        <p:txBody>
+          <a:bodyPr rtlCol="0" anchor="ctr"/>
+          <a:lstStyle/>
+          <a:p>
+            <a:pPr algn="ctr"/>
+            <a:r>
+              <a:rPr lang="en-US" sz="1800" dirty="0"/>
+              <a:t>Class WidgetCard (VoidCallBack onTap)</a:t>
+            </a:r>
+            <a:endParaRPr lang="th-TH" sz="1800" dirty="0"/>
+          </a:p>
+        </p:txBody>
+      </p:sp>
       <p:pic>
         <p:nvPicPr>
-          <p:cNvPr id="10" name="Picture 9">
-            <a:extLst>
-              <a:ext uri="{FF2B5EF4-FFF2-40B4-BE49-F238E27FC236}">
-                <a16:creationId xmlns:a16="http://schemas.microsoft.com/office/drawing/2014/main" id="{22DBEAD2-BA06-4C41-A628-458941CA4F19}"/>
+          <p:cNvPr id="20" name="Picture 19">
+            <a:extLst>
+              <a:ext uri="{FF2B5EF4-FFF2-40B4-BE49-F238E27FC236}">
+                <a16:creationId xmlns:a16="http://schemas.microsoft.com/office/drawing/2014/main" id="{F17E92F6-7D5A-42CB-87C9-DB8A326BB1D9}"/>
               </a:ext>
             </a:extLst>
           </p:cNvPr>
@@ -5828,18 +6515,71 @@
         </p:blipFill>
         <p:spPr>
           <a:xfrm>
-            <a:off x="6271994" y="723900"/>
-            <a:ext cx="2129055" cy="4803850"/>
+            <a:off x="9242846" y="679009"/>
+            <a:ext cx="2821258" cy="1550655"/>
           </a:xfrm>
           <a:prstGeom prst="rect">
             <a:avLst/>
           </a:prstGeom>
         </p:spPr>
       </p:pic>
+      <p:sp>
+        <p:nvSpPr>
+          <p:cNvPr id="21" name="Speech Bubble: Rectangle 20">
+            <a:extLst>
+              <a:ext uri="{FF2B5EF4-FFF2-40B4-BE49-F238E27FC236}">
+                <a16:creationId xmlns:a16="http://schemas.microsoft.com/office/drawing/2014/main" id="{9C290E85-BD7E-44D5-894C-05224887B0A4}"/>
+              </a:ext>
+            </a:extLst>
+          </p:cNvPr>
+          <p:cNvSpPr/>
+          <p:nvPr/>
+        </p:nvSpPr>
+        <p:spPr>
+          <a:xfrm>
+            <a:off x="9242846" y="2276076"/>
+            <a:ext cx="2821258" cy="474444"/>
+          </a:xfrm>
+          <a:prstGeom prst="wedgeRectCallout">
+            <a:avLst>
+              <a:gd name="adj1" fmla="val 34065"/>
+              <a:gd name="adj2" fmla="val 16897"/>
+            </a:avLst>
+          </a:prstGeom>
+        </p:spPr>
+        <p:style>
+          <a:lnRef idx="2">
+            <a:schemeClr val="accent1">
+              <a:shade val="50000"/>
+            </a:schemeClr>
+          </a:lnRef>
+          <a:fillRef idx="1">
+            <a:schemeClr val="accent1"/>
+          </a:fillRef>
+          <a:effectRef idx="0">
+            <a:schemeClr val="accent1"/>
+          </a:effectRef>
+          <a:fontRef idx="minor">
+            <a:schemeClr val="lt1"/>
+          </a:fontRef>
+        </p:style>
+        <p:txBody>
+          <a:bodyPr rtlCol="0" anchor="ctr"/>
+          <a:lstStyle/>
+          <a:p>
+            <a:pPr algn="ctr"/>
+            <a:r>
+              <a:rPr lang="en-US" sz="1800" dirty="0"/>
+              <a:t>WidgetCard ( onTap: () {Navigate})</a:t>
+            </a:r>
+            <a:endParaRPr lang="th-TH" sz="1800" dirty="0"/>
+          </a:p>
+        </p:txBody>
+      </p:sp>
     </p:spTree>
     <p:extLst>
       <p:ext uri="{BB962C8B-B14F-4D97-AF65-F5344CB8AC3E}">
-        <p14:creationId xmlns:p14="http://schemas.microsoft.com/office/powerpoint/2010/main" val="436143495"/>
+        <p14:creationId xmlns:p14="http://schemas.microsoft.com/office/powerpoint/2010/main" val="3709306774"/>
       </p:ext>
     </p:extLst>
   </p:cSld>
@@ -5871,7 +6611,7 @@
           <p:cNvPr id="2" name="Title 1">
             <a:extLst>
               <a:ext uri="{FF2B5EF4-FFF2-40B4-BE49-F238E27FC236}">
-                <a16:creationId xmlns:a16="http://schemas.microsoft.com/office/drawing/2014/main" id="{F8BAF344-D23D-4773-B8FE-8B734F6B1229}"/>
+                <a16:creationId xmlns:a16="http://schemas.microsoft.com/office/drawing/2014/main" id="{53C51CB8-3B93-4212-9C3A-99955B444385}"/>
               </a:ext>
             </a:extLst>
           </p:cNvPr>
@@ -5889,73 +6629,225 @@
           <a:p>
             <a:r>
               <a:rPr lang="en-US" dirty="0"/>
-              <a:t>Tasks</a:t>
+              <a:t>Flutter DataTable</a:t>
             </a:r>
             <a:endParaRPr lang="th-TH" dirty="0"/>
           </a:p>
         </p:txBody>
       </p:sp>
-      <p:sp>
-        <p:nvSpPr>
-          <p:cNvPr id="3" name="TextBox 2">
-            <a:extLst>
-              <a:ext uri="{FF2B5EF4-FFF2-40B4-BE49-F238E27FC236}">
-                <a16:creationId xmlns:a16="http://schemas.microsoft.com/office/drawing/2014/main" id="{A93BDF4F-7E57-43FD-A7BC-06058D4BFA73}"/>
-              </a:ext>
-            </a:extLst>
-          </p:cNvPr>
-          <p:cNvSpPr txBox="1"/>
+      <p:pic>
+        <p:nvPicPr>
+          <p:cNvPr id="4" name="Picture 3">
+            <a:extLst>
+              <a:ext uri="{FF2B5EF4-FFF2-40B4-BE49-F238E27FC236}">
+                <a16:creationId xmlns:a16="http://schemas.microsoft.com/office/drawing/2014/main" id="{D90127B9-06CD-4740-9130-6725A3439D31}"/>
+              </a:ext>
+            </a:extLst>
+          </p:cNvPr>
+          <p:cNvPicPr>
+            <a:picLocks noChangeAspect="1"/>
+          </p:cNvPicPr>
           <p:nvPr/>
-        </p:nvSpPr>
-        <p:spPr>
-          <a:xfrm>
-            <a:off x="933450" y="762000"/>
-            <a:ext cx="5829300" cy="1384995"/>
+        </p:nvPicPr>
+        <p:blipFill>
+          <a:blip r:embed="rId2"/>
+          <a:stretch>
+            <a:fillRect/>
+          </a:stretch>
+        </p:blipFill>
+        <p:spPr>
+          <a:xfrm>
+            <a:off x="838200" y="904577"/>
+            <a:ext cx="2143424" cy="4267796"/>
           </a:xfrm>
           <a:prstGeom prst="rect">
             <a:avLst/>
           </a:prstGeom>
-          <a:noFill/>
-        </p:spPr>
-        <p:txBody>
-          <a:bodyPr wrap="square" rtlCol="0">
-            <a:spAutoFit/>
-          </a:bodyPr>
-          <a:lstStyle/>
-          <a:p>
-            <a:pPr marL="514350" indent="-514350">
-              <a:buAutoNum type="arabicPeriod"/>
-            </a:pPr>
-            <a:r>
-              <a:rPr lang="en-US" dirty="0"/>
-              <a:t>Upload to web</a:t>
-            </a:r>
-          </a:p>
-          <a:p>
-            <a:pPr marL="514350" indent="-514350">
-              <a:buAutoNum type="arabicPeriod"/>
-            </a:pPr>
-            <a:r>
-              <a:rPr lang="en-US" dirty="0"/>
-              <a:t>Call api</a:t>
-            </a:r>
-          </a:p>
-          <a:p>
-            <a:pPr marL="514350" indent="-514350">
-              <a:buAutoNum type="arabicPeriod"/>
-            </a:pPr>
-            <a:r>
-              <a:rPr lang="en-US" dirty="0"/>
-              <a:t>Run on Android studio</a:t>
-            </a:r>
-            <a:endParaRPr lang="th-TH" dirty="0"/>
-          </a:p>
-        </p:txBody>
-      </p:sp>
+        </p:spPr>
+      </p:pic>
+      <p:pic>
+        <p:nvPicPr>
+          <p:cNvPr id="6" name="Picture 5">
+            <a:extLst>
+              <a:ext uri="{FF2B5EF4-FFF2-40B4-BE49-F238E27FC236}">
+                <a16:creationId xmlns:a16="http://schemas.microsoft.com/office/drawing/2014/main" id="{505EF67B-242D-4316-8576-7880DB1E55BD}"/>
+              </a:ext>
+            </a:extLst>
+          </p:cNvPr>
+          <p:cNvPicPr>
+            <a:picLocks noChangeAspect="1"/>
+          </p:cNvPicPr>
+          <p:nvPr/>
+        </p:nvPicPr>
+        <p:blipFill>
+          <a:blip r:embed="rId3"/>
+          <a:stretch>
+            <a:fillRect/>
+          </a:stretch>
+        </p:blipFill>
+        <p:spPr>
+          <a:xfrm>
+            <a:off x="3328816" y="904577"/>
+            <a:ext cx="2790900" cy="4267795"/>
+          </a:xfrm>
+          <a:prstGeom prst="rect">
+            <a:avLst/>
+          </a:prstGeom>
+        </p:spPr>
+      </p:pic>
     </p:spTree>
     <p:extLst>
       <p:ext uri="{BB962C8B-B14F-4D97-AF65-F5344CB8AC3E}">
-        <p14:creationId xmlns:p14="http://schemas.microsoft.com/office/powerpoint/2010/main" val="3240568446"/>
+        <p14:creationId xmlns:p14="http://schemas.microsoft.com/office/powerpoint/2010/main" val="2248180005"/>
+      </p:ext>
+    </p:extLst>
+  </p:cSld>
+  <p:clrMapOvr>
+    <a:masterClrMapping/>
+  </p:clrMapOvr>
+</p:sld>
+</file>
+
+<file path=ppt/slides/slide9.xml><?xml version="1.0" encoding="utf-8"?>
+<p:sld xmlns:a="http://schemas.openxmlformats.org/drawingml/2006/main" xmlns:r="http://schemas.openxmlformats.org/officeDocument/2006/relationships" xmlns:p="http://schemas.openxmlformats.org/presentationml/2006/main">
+  <p:cSld>
+    <p:spTree>
+      <p:nvGrpSpPr>
+        <p:cNvPr id="1" name=""/>
+        <p:cNvGrpSpPr/>
+        <p:nvPr/>
+      </p:nvGrpSpPr>
+      <p:grpSpPr>
+        <a:xfrm>
+          <a:off x="0" y="0"/>
+          <a:ext cx="0" cy="0"/>
+          <a:chOff x="0" y="0"/>
+          <a:chExt cx="0" cy="0"/>
+        </a:xfrm>
+      </p:grpSpPr>
+      <p:sp>
+        <p:nvSpPr>
+          <p:cNvPr id="2" name="Title 1">
+            <a:extLst>
+              <a:ext uri="{FF2B5EF4-FFF2-40B4-BE49-F238E27FC236}">
+                <a16:creationId xmlns:a16="http://schemas.microsoft.com/office/drawing/2014/main" id="{53C51CB8-3B93-4212-9C3A-99955B444385}"/>
+              </a:ext>
+            </a:extLst>
+          </p:cNvPr>
+          <p:cNvSpPr>
+            <a:spLocks noGrp="1"/>
+          </p:cNvSpPr>
+          <p:nvPr>
+            <p:ph type="title"/>
+          </p:nvPr>
+        </p:nvSpPr>
+        <p:spPr/>
+        <p:txBody>
+          <a:bodyPr/>
+          <a:lstStyle/>
+          <a:p>
+            <a:r>
+              <a:rPr lang="en-US" dirty="0"/>
+              <a:t>Search Parameter</a:t>
+            </a:r>
+            <a:endParaRPr lang="th-TH" dirty="0"/>
+          </a:p>
+        </p:txBody>
+      </p:sp>
+      <p:pic>
+        <p:nvPicPr>
+          <p:cNvPr id="5" name="Picture 4">
+            <a:extLst>
+              <a:ext uri="{FF2B5EF4-FFF2-40B4-BE49-F238E27FC236}">
+                <a16:creationId xmlns:a16="http://schemas.microsoft.com/office/drawing/2014/main" id="{B8DD4489-5BF7-49BC-837B-CEBDD0E7762D}"/>
+              </a:ext>
+            </a:extLst>
+          </p:cNvPr>
+          <p:cNvPicPr>
+            <a:picLocks noChangeAspect="1"/>
+          </p:cNvPicPr>
+          <p:nvPr/>
+        </p:nvPicPr>
+        <p:blipFill>
+          <a:blip r:embed="rId2"/>
+          <a:stretch>
+            <a:fillRect/>
+          </a:stretch>
+        </p:blipFill>
+        <p:spPr>
+          <a:xfrm>
+            <a:off x="961486" y="723900"/>
+            <a:ext cx="2324863" cy="4739145"/>
+          </a:xfrm>
+          <a:prstGeom prst="rect">
+            <a:avLst/>
+          </a:prstGeom>
+        </p:spPr>
+      </p:pic>
+      <p:pic>
+        <p:nvPicPr>
+          <p:cNvPr id="8" name="Picture 7">
+            <a:extLst>
+              <a:ext uri="{FF2B5EF4-FFF2-40B4-BE49-F238E27FC236}">
+                <a16:creationId xmlns:a16="http://schemas.microsoft.com/office/drawing/2014/main" id="{92BBB1AC-3D77-48A2-B5B7-8CC4986DED1B}"/>
+              </a:ext>
+            </a:extLst>
+          </p:cNvPr>
+          <p:cNvPicPr>
+            <a:picLocks noChangeAspect="1"/>
+          </p:cNvPicPr>
+          <p:nvPr/>
+        </p:nvPicPr>
+        <p:blipFill>
+          <a:blip r:embed="rId3"/>
+          <a:stretch>
+            <a:fillRect/>
+          </a:stretch>
+        </p:blipFill>
+        <p:spPr>
+          <a:xfrm>
+            <a:off x="3580247" y="723900"/>
+            <a:ext cx="2339760" cy="4672452"/>
+          </a:xfrm>
+          <a:prstGeom prst="rect">
+            <a:avLst/>
+          </a:prstGeom>
+        </p:spPr>
+      </p:pic>
+      <p:pic>
+        <p:nvPicPr>
+          <p:cNvPr id="10" name="Picture 9">
+            <a:extLst>
+              <a:ext uri="{FF2B5EF4-FFF2-40B4-BE49-F238E27FC236}">
+                <a16:creationId xmlns:a16="http://schemas.microsoft.com/office/drawing/2014/main" id="{22DBEAD2-BA06-4C41-A628-458941CA4F19}"/>
+              </a:ext>
+            </a:extLst>
+          </p:cNvPr>
+          <p:cNvPicPr>
+            <a:picLocks noChangeAspect="1"/>
+          </p:cNvPicPr>
+          <p:nvPr/>
+        </p:nvPicPr>
+        <p:blipFill>
+          <a:blip r:embed="rId4"/>
+          <a:stretch>
+            <a:fillRect/>
+          </a:stretch>
+        </p:blipFill>
+        <p:spPr>
+          <a:xfrm>
+            <a:off x="6271994" y="723900"/>
+            <a:ext cx="2129055" cy="4803850"/>
+          </a:xfrm>
+          <a:prstGeom prst="rect">
+            <a:avLst/>
+          </a:prstGeom>
+        </p:spPr>
+      </p:pic>
+    </p:spTree>
+    <p:extLst>
+      <p:ext uri="{BB962C8B-B14F-4D97-AF65-F5344CB8AC3E}">
+        <p14:creationId xmlns:p14="http://schemas.microsoft.com/office/powerpoint/2010/main" val="436143495"/>
       </p:ext>
     </p:extLst>
   </p:cSld>

</xml_diff>

<commit_message>
search api sap po all
</commit_message>
<xml_diff>
--- a/documents/WISSFLUTTER01_DOC_REV1.pptx
+++ b/documents/WISSFLUTTER01_DOC_REV1.pptx
@@ -5,10 +5,10 @@
     <p:sldMasterId id="2147483648" r:id="rId1"/>
   </p:sldMasterIdLst>
   <p:notesMasterIdLst>
-    <p:notesMasterId r:id="rId12"/>
+    <p:notesMasterId r:id="rId13"/>
   </p:notesMasterIdLst>
   <p:handoutMasterIdLst>
-    <p:handoutMasterId r:id="rId13"/>
+    <p:handoutMasterId r:id="rId14"/>
   </p:handoutMasterIdLst>
   <p:sldIdLst>
     <p:sldId id="477" r:id="rId2"/>
@@ -19,8 +19,9 @@
     <p:sldId id="485" r:id="rId7"/>
     <p:sldId id="486" r:id="rId8"/>
     <p:sldId id="480" r:id="rId9"/>
-    <p:sldId id="481" r:id="rId10"/>
-    <p:sldId id="479" r:id="rId11"/>
+    <p:sldId id="487" r:id="rId10"/>
+    <p:sldId id="481" r:id="rId11"/>
+    <p:sldId id="479" r:id="rId12"/>
   </p:sldIdLst>
   <p:sldSz cx="12192000" cy="6858000"/>
   <p:notesSz cx="6858000" cy="9144000"/>
@@ -224,7 +225,7 @@
           <a:p>
             <a:fld id="{626A2A7E-56C3-42AA-9156-AEABA577C062}" type="datetimeFigureOut">
               <a:rPr lang="th-TH" smtClean="0"/>
-              <a:t>26/02/65</a:t>
+              <a:t>27/02/65</a:t>
             </a:fld>
             <a:endParaRPr lang="th-TH"/>
           </a:p>
@@ -401,7 +402,7 @@
           <a:p>
             <a:fld id="{17F805D4-B8A8-454F-90F6-0A8987438DEE}" type="datetimeFigureOut">
               <a:rPr lang="th-TH" smtClean="0"/>
-              <a:t>26/02/65</a:t>
+              <a:t>27/02/65</a:t>
             </a:fld>
             <a:endParaRPr lang="th-TH"/>
           </a:p>
@@ -4400,6 +4401,155 @@
           <p:cNvPr id="2" name="Title 1">
             <a:extLst>
               <a:ext uri="{FF2B5EF4-FFF2-40B4-BE49-F238E27FC236}">
+                <a16:creationId xmlns:a16="http://schemas.microsoft.com/office/drawing/2014/main" id="{53C51CB8-3B93-4212-9C3A-99955B444385}"/>
+              </a:ext>
+            </a:extLst>
+          </p:cNvPr>
+          <p:cNvSpPr>
+            <a:spLocks noGrp="1"/>
+          </p:cNvSpPr>
+          <p:nvPr>
+            <p:ph type="title"/>
+          </p:nvPr>
+        </p:nvSpPr>
+        <p:spPr/>
+        <p:txBody>
+          <a:bodyPr/>
+          <a:lstStyle/>
+          <a:p>
+            <a:r>
+              <a:rPr lang="en-US" dirty="0"/>
+              <a:t>Search Parameter</a:t>
+            </a:r>
+            <a:endParaRPr lang="th-TH" dirty="0"/>
+          </a:p>
+        </p:txBody>
+      </p:sp>
+      <p:pic>
+        <p:nvPicPr>
+          <p:cNvPr id="5" name="Picture 4">
+            <a:extLst>
+              <a:ext uri="{FF2B5EF4-FFF2-40B4-BE49-F238E27FC236}">
+                <a16:creationId xmlns:a16="http://schemas.microsoft.com/office/drawing/2014/main" id="{B8DD4489-5BF7-49BC-837B-CEBDD0E7762D}"/>
+              </a:ext>
+            </a:extLst>
+          </p:cNvPr>
+          <p:cNvPicPr>
+            <a:picLocks noChangeAspect="1"/>
+          </p:cNvPicPr>
+          <p:nvPr/>
+        </p:nvPicPr>
+        <p:blipFill>
+          <a:blip r:embed="rId2"/>
+          <a:stretch>
+            <a:fillRect/>
+          </a:stretch>
+        </p:blipFill>
+        <p:spPr>
+          <a:xfrm>
+            <a:off x="961486" y="723900"/>
+            <a:ext cx="2324863" cy="4739145"/>
+          </a:xfrm>
+          <a:prstGeom prst="rect">
+            <a:avLst/>
+          </a:prstGeom>
+        </p:spPr>
+      </p:pic>
+      <p:pic>
+        <p:nvPicPr>
+          <p:cNvPr id="8" name="Picture 7">
+            <a:extLst>
+              <a:ext uri="{FF2B5EF4-FFF2-40B4-BE49-F238E27FC236}">
+                <a16:creationId xmlns:a16="http://schemas.microsoft.com/office/drawing/2014/main" id="{92BBB1AC-3D77-48A2-B5B7-8CC4986DED1B}"/>
+              </a:ext>
+            </a:extLst>
+          </p:cNvPr>
+          <p:cNvPicPr>
+            <a:picLocks noChangeAspect="1"/>
+          </p:cNvPicPr>
+          <p:nvPr/>
+        </p:nvPicPr>
+        <p:blipFill>
+          <a:blip r:embed="rId3"/>
+          <a:stretch>
+            <a:fillRect/>
+          </a:stretch>
+        </p:blipFill>
+        <p:spPr>
+          <a:xfrm>
+            <a:off x="3580247" y="723900"/>
+            <a:ext cx="2339760" cy="4672452"/>
+          </a:xfrm>
+          <a:prstGeom prst="rect">
+            <a:avLst/>
+          </a:prstGeom>
+        </p:spPr>
+      </p:pic>
+      <p:pic>
+        <p:nvPicPr>
+          <p:cNvPr id="10" name="Picture 9">
+            <a:extLst>
+              <a:ext uri="{FF2B5EF4-FFF2-40B4-BE49-F238E27FC236}">
+                <a16:creationId xmlns:a16="http://schemas.microsoft.com/office/drawing/2014/main" id="{22DBEAD2-BA06-4C41-A628-458941CA4F19}"/>
+              </a:ext>
+            </a:extLst>
+          </p:cNvPr>
+          <p:cNvPicPr>
+            <a:picLocks noChangeAspect="1"/>
+          </p:cNvPicPr>
+          <p:nvPr/>
+        </p:nvPicPr>
+        <p:blipFill>
+          <a:blip r:embed="rId4"/>
+          <a:stretch>
+            <a:fillRect/>
+          </a:stretch>
+        </p:blipFill>
+        <p:spPr>
+          <a:xfrm>
+            <a:off x="6271994" y="723900"/>
+            <a:ext cx="2129055" cy="4803850"/>
+          </a:xfrm>
+          <a:prstGeom prst="rect">
+            <a:avLst/>
+          </a:prstGeom>
+        </p:spPr>
+      </p:pic>
+    </p:spTree>
+    <p:extLst>
+      <p:ext uri="{BB962C8B-B14F-4D97-AF65-F5344CB8AC3E}">
+        <p14:creationId xmlns:p14="http://schemas.microsoft.com/office/powerpoint/2010/main" val="436143495"/>
+      </p:ext>
+    </p:extLst>
+  </p:cSld>
+  <p:clrMapOvr>
+    <a:masterClrMapping/>
+  </p:clrMapOvr>
+</p:sld>
+</file>
+
+<file path=ppt/slides/slide11.xml><?xml version="1.0" encoding="utf-8"?>
+<p:sld xmlns:a="http://schemas.openxmlformats.org/drawingml/2006/main" xmlns:r="http://schemas.openxmlformats.org/officeDocument/2006/relationships" xmlns:p="http://schemas.openxmlformats.org/presentationml/2006/main">
+  <p:cSld>
+    <p:spTree>
+      <p:nvGrpSpPr>
+        <p:cNvPr id="1" name=""/>
+        <p:cNvGrpSpPr/>
+        <p:nvPr/>
+      </p:nvGrpSpPr>
+      <p:grpSpPr>
+        <a:xfrm>
+          <a:off x="0" y="0"/>
+          <a:ext cx="0" cy="0"/>
+          <a:chOff x="0" y="0"/>
+          <a:chExt cx="0" cy="0"/>
+        </a:xfrm>
+      </p:grpSpPr>
+      <p:sp>
+        <p:nvSpPr>
+          <p:cNvPr id="2" name="Title 1">
+            <a:extLst>
+              <a:ext uri="{FF2B5EF4-FFF2-40B4-BE49-F238E27FC236}">
                 <a16:creationId xmlns:a16="http://schemas.microsoft.com/office/drawing/2014/main" id="{F8BAF344-D23D-4773-B8FE-8B734F6B1229}"/>
               </a:ext>
             </a:extLst>
@@ -6695,6 +6845,36 @@
           </a:prstGeom>
         </p:spPr>
       </p:pic>
+      <p:pic>
+        <p:nvPicPr>
+          <p:cNvPr id="5" name="Picture 4">
+            <a:extLst>
+              <a:ext uri="{FF2B5EF4-FFF2-40B4-BE49-F238E27FC236}">
+                <a16:creationId xmlns:a16="http://schemas.microsoft.com/office/drawing/2014/main" id="{BA843994-B001-4D2B-B042-4279A35E47F4}"/>
+              </a:ext>
+            </a:extLst>
+          </p:cNvPr>
+          <p:cNvPicPr>
+            <a:picLocks noChangeAspect="1"/>
+          </p:cNvPicPr>
+          <p:nvPr/>
+        </p:nvPicPr>
+        <p:blipFill>
+          <a:blip r:embed="rId4"/>
+          <a:stretch>
+            <a:fillRect/>
+          </a:stretch>
+        </p:blipFill>
+        <p:spPr>
+          <a:xfrm>
+            <a:off x="6466908" y="708500"/>
+            <a:ext cx="2250024" cy="4659948"/>
+          </a:xfrm>
+          <a:prstGeom prst="rect">
+            <a:avLst/>
+          </a:prstGeom>
+        </p:spPr>
+      </p:pic>
     </p:spTree>
     <p:extLst>
       <p:ext uri="{BB962C8B-B14F-4D97-AF65-F5344CB8AC3E}">
@@ -6711,6 +6891,14 @@
 <file path=ppt/slides/slide9.xml><?xml version="1.0" encoding="utf-8"?>
 <p:sld xmlns:a="http://schemas.openxmlformats.org/drawingml/2006/main" xmlns:r="http://schemas.openxmlformats.org/officeDocument/2006/relationships" xmlns:p="http://schemas.openxmlformats.org/presentationml/2006/main">
   <p:cSld>
+    <p:bg>
+      <p:bgPr>
+        <a:solidFill>
+          <a:schemeClr val="bg1"/>
+        </a:solidFill>
+        <a:effectLst/>
+      </p:bgPr>
+    </p:bg>
     <p:spTree>
       <p:nvGrpSpPr>
         <p:cNvPr id="1" name=""/>
@@ -6725,12 +6913,72 @@
           <a:chExt cx="0" cy="0"/>
         </a:xfrm>
       </p:grpSpPr>
+      <p:sp useBgFill="1">
+        <p:nvSpPr>
+          <p:cNvPr id="19" name="Rectangle 18">
+            <a:extLst>
+              <a:ext uri="{FF2B5EF4-FFF2-40B4-BE49-F238E27FC236}">
+                <a16:creationId xmlns:a16="http://schemas.microsoft.com/office/drawing/2014/main" id="{2C61293E-6EBE-43EF-A52C-9BEBFD7679D4}"/>
+              </a:ext>
+              <a:ext uri="{C183D7F6-B498-43B3-948B-1728B52AA6E4}">
+                <adec:decorative xmlns:adec="http://schemas.microsoft.com/office/drawing/2017/decorative" val="1"/>
+              </a:ext>
+            </a:extLst>
+          </p:cNvPr>
+          <p:cNvSpPr>
+            <a:spLocks noGrp="1" noRot="1" noChangeAspect="1" noMove="1" noResize="1" noEditPoints="1" noAdjustHandles="1" noChangeArrowheads="1" noChangeShapeType="1" noTextEdit="1"/>
+          </p:cNvSpPr>
+          <p:nvPr>
+            <p:extLst>
+              <p:ext uri="{386F3935-93C4-4BCD-93E2-E3B085C9AB24}">
+                <p16:designElem xmlns:p16="http://schemas.microsoft.com/office/powerpoint/2015/main" val="1"/>
+              </p:ext>
+            </p:extLst>
+          </p:nvPr>
+        </p:nvSpPr>
+        <p:spPr>
+          <a:xfrm>
+            <a:off x="0" y="0"/>
+            <a:ext cx="12188952" cy="6858000"/>
+          </a:xfrm>
+          <a:prstGeom prst="rect">
+            <a:avLst/>
+          </a:prstGeom>
+          <a:ln>
+            <a:noFill/>
+          </a:ln>
+        </p:spPr>
+        <p:style>
+          <a:lnRef idx="2">
+            <a:schemeClr val="accent1">
+              <a:shade val="50000"/>
+            </a:schemeClr>
+          </a:lnRef>
+          <a:fillRef idx="1">
+            <a:schemeClr val="accent1"/>
+          </a:fillRef>
+          <a:effectRef idx="0">
+            <a:schemeClr val="accent1"/>
+          </a:effectRef>
+          <a:fontRef idx="minor">
+            <a:schemeClr val="lt1"/>
+          </a:fontRef>
+        </p:style>
+        <p:txBody>
+          <a:bodyPr rtlCol="0" anchor="ctr"/>
+          <a:lstStyle/>
+          <a:p>
+            <a:pPr algn="ctr"/>
+            <a:endParaRPr lang="en-US"/>
+          </a:p>
+        </p:txBody>
+      </p:sp>
       <p:sp>
         <p:nvSpPr>
           <p:cNvPr id="2" name="Title 1">
             <a:extLst>
               <a:ext uri="{FF2B5EF4-FFF2-40B4-BE49-F238E27FC236}">
-                <a16:creationId xmlns:a16="http://schemas.microsoft.com/office/drawing/2014/main" id="{53C51CB8-3B93-4212-9C3A-99955B444385}"/>
+                <a16:creationId xmlns:a16="http://schemas.microsoft.com/office/drawing/2014/main" id="{608212CC-9790-4A72-89ED-B430101C3901}"/>
               </a:ext>
             </a:extLst>
           </p:cNvPr>
@@ -6741,25 +6989,35 @@
             <p:ph type="title"/>
           </p:nvPr>
         </p:nvSpPr>
-        <p:spPr/>
-        <p:txBody>
-          <a:bodyPr/>
+        <p:spPr>
+          <a:xfrm>
+            <a:off x="5297762" y="329184"/>
+            <a:ext cx="6251110" cy="1783080"/>
+          </a:xfrm>
+        </p:spPr>
+        <p:txBody>
+          <a:bodyPr vert="horz" lIns="91440" tIns="45720" rIns="91440" bIns="45720" rtlCol="0" anchor="b">
+            <a:normAutofit/>
+          </a:bodyPr>
           <a:lstStyle/>
           <a:p>
             <a:r>
-              <a:rPr lang="en-US" dirty="0"/>
-              <a:t>Search Parameter</a:t>
-            </a:r>
-            <a:endParaRPr lang="th-TH" dirty="0"/>
+              <a:rPr lang="en-US" sz="5400" dirty="0">
+                <a:solidFill>
+                  <a:schemeClr val="tx1"/>
+                </a:solidFill>
+              </a:rPr>
+              <a:t>Data Table and API</a:t>
+            </a:r>
           </a:p>
         </p:txBody>
       </p:sp>
       <p:pic>
         <p:nvPicPr>
-          <p:cNvPr id="5" name="Picture 4">
-            <a:extLst>
-              <a:ext uri="{FF2B5EF4-FFF2-40B4-BE49-F238E27FC236}">
-                <a16:creationId xmlns:a16="http://schemas.microsoft.com/office/drawing/2014/main" id="{B8DD4489-5BF7-49BC-837B-CEBDD0E7762D}"/>
+          <p:cNvPr id="9" name="Picture 8">
+            <a:extLst>
+              <a:ext uri="{FF2B5EF4-FFF2-40B4-BE49-F238E27FC236}">
+                <a16:creationId xmlns:a16="http://schemas.microsoft.com/office/drawing/2014/main" id="{00EE3265-1F05-4DDB-A82D-33A062481995}"/>
               </a:ext>
             </a:extLst>
           </p:cNvPr>
@@ -6768,86 +7026,700 @@
           </p:cNvPicPr>
           <p:nvPr/>
         </p:nvPicPr>
-        <p:blipFill>
+        <p:blipFill rotWithShape="1">
           <a:blip r:embed="rId2"/>
-          <a:stretch>
-            <a:fillRect/>
-          </a:stretch>
+          <a:srcRect t="6559" b="13189"/>
+          <a:stretch/>
         </p:blipFill>
         <p:spPr>
           <a:xfrm>
-            <a:off x="961486" y="723900"/>
-            <a:ext cx="2324863" cy="4739145"/>
+            <a:off x="1" y="10"/>
+            <a:ext cx="4657344" cy="6857990"/>
+          </a:xfrm>
+          <a:custGeom>
+            <a:avLst/>
+            <a:gdLst/>
+            <a:ahLst/>
+            <a:cxnLst/>
+            <a:rect l="l" t="t" r="r" b="b"/>
+            <a:pathLst>
+              <a:path w="4657344" h="6858000">
+                <a:moveTo>
+                  <a:pt x="0" y="0"/>
+                </a:moveTo>
+                <a:lnTo>
+                  <a:pt x="3429755" y="0"/>
+                </a:lnTo>
+                <a:lnTo>
+                  <a:pt x="3526016" y="148742"/>
+                </a:lnTo>
+                <a:cubicBezTo>
+                  <a:pt x="3657740" y="365513"/>
+                  <a:pt x="3777402" y="589569"/>
+                  <a:pt x="3886489" y="819975"/>
+                </a:cubicBezTo>
+                <a:cubicBezTo>
+                  <a:pt x="3891856" y="833492"/>
+                  <a:pt x="3900663" y="845393"/>
+                  <a:pt x="3912049" y="854514"/>
+                </a:cubicBezTo>
+                <a:cubicBezTo>
+                  <a:pt x="3897352" y="819849"/>
+                  <a:pt x="3883037" y="784928"/>
+                  <a:pt x="3868083" y="750263"/>
+                </a:cubicBezTo>
+                <a:cubicBezTo>
+                  <a:pt x="3806989" y="608712"/>
+                  <a:pt x="3742478" y="469145"/>
+                  <a:pt x="3674155" y="331786"/>
+                </a:cubicBezTo>
+                <a:lnTo>
+                  <a:pt x="3496656" y="0"/>
+                </a:lnTo>
+                <a:lnTo>
+                  <a:pt x="3554371" y="0"/>
+                </a:lnTo>
+                <a:lnTo>
+                  <a:pt x="3661621" y="196614"/>
+                </a:lnTo>
+                <a:cubicBezTo>
+                  <a:pt x="3856899" y="573253"/>
+                  <a:pt x="4021071" y="966066"/>
+                  <a:pt x="4161279" y="1371196"/>
+                </a:cubicBezTo>
+                <a:cubicBezTo>
+                  <a:pt x="4379525" y="2007265"/>
+                  <a:pt x="4530141" y="2664286"/>
+                  <a:pt x="4610660" y="3331516"/>
+                </a:cubicBezTo>
+                <a:cubicBezTo>
+                  <a:pt x="4652837" y="3672965"/>
+                  <a:pt x="4671625" y="4013908"/>
+                  <a:pt x="4645040" y="4357388"/>
+                </a:cubicBezTo>
+                <a:cubicBezTo>
+                  <a:pt x="4613599" y="4758899"/>
+                  <a:pt x="4566181" y="5157998"/>
+                  <a:pt x="4485789" y="5552906"/>
+                </a:cubicBezTo>
+                <a:cubicBezTo>
+                  <a:pt x="4397121" y="5988893"/>
+                  <a:pt x="4276748" y="6414594"/>
+                  <a:pt x="4117769" y="6828295"/>
+                </a:cubicBezTo>
+                <a:lnTo>
+                  <a:pt x="4105288" y="6858000"/>
+                </a:lnTo>
+                <a:lnTo>
+                  <a:pt x="4052520" y="6858000"/>
+                </a:lnTo>
+                <a:lnTo>
+                  <a:pt x="4059369" y="6841549"/>
+                </a:lnTo>
+                <a:cubicBezTo>
+                  <a:pt x="4147276" y="6614016"/>
+                  <a:pt x="4224193" y="6380817"/>
+                  <a:pt x="4291518" y="6142729"/>
+                </a:cubicBezTo>
+                <a:cubicBezTo>
+                  <a:pt x="4350055" y="5935370"/>
+                  <a:pt x="4393256" y="5723695"/>
+                  <a:pt x="4443357" y="5513923"/>
+                </a:cubicBezTo>
+                <a:cubicBezTo>
+                  <a:pt x="4444541" y="5502788"/>
+                  <a:pt x="4445137" y="5491601"/>
+                  <a:pt x="4445146" y="5480401"/>
+                </a:cubicBezTo>
+                <a:cubicBezTo>
+                  <a:pt x="4408465" y="5607635"/>
+                  <a:pt x="4379196" y="5719759"/>
+                  <a:pt x="4344559" y="5830359"/>
+                </a:cubicBezTo>
+                <a:cubicBezTo>
+                  <a:pt x="4254261" y="6118381"/>
+                  <a:pt x="4150112" y="6398531"/>
+                  <a:pt x="4031702" y="6670527"/>
+                </a:cubicBezTo>
+                <a:lnTo>
+                  <a:pt x="3943824" y="6858000"/>
+                </a:lnTo>
+                <a:lnTo>
+                  <a:pt x="0" y="6858000"/>
+                </a:lnTo>
+                <a:close/>
+              </a:path>
+            </a:pathLst>
+          </a:custGeom>
+        </p:spPr>
+      </p:pic>
+      <p:sp>
+        <p:nvSpPr>
+          <p:cNvPr id="21" name="sketchy line">
+            <a:extLst>
+              <a:ext uri="{FF2B5EF4-FFF2-40B4-BE49-F238E27FC236}">
+                <a16:creationId xmlns:a16="http://schemas.microsoft.com/office/drawing/2014/main" id="{21540236-BFD5-4A9D-8840-4703E7F76825}"/>
+              </a:ext>
+              <a:ext uri="{C183D7F6-B498-43B3-948B-1728B52AA6E4}">
+                <adec:decorative xmlns:adec="http://schemas.microsoft.com/office/drawing/2017/decorative" val="1"/>
+              </a:ext>
+            </a:extLst>
+          </p:cNvPr>
+          <p:cNvSpPr>
+            <a:spLocks noGrp="1" noRot="1" noChangeAspect="1" noMove="1" noResize="1" noEditPoints="1" noAdjustHandles="1" noChangeArrowheads="1" noChangeShapeType="1" noTextEdit="1"/>
+          </p:cNvSpPr>
+          <p:nvPr>
+            <p:extLst>
+              <p:ext uri="{386F3935-93C4-4BCD-93E2-E3B085C9AB24}">
+                <p16:designElem xmlns:p16="http://schemas.microsoft.com/office/powerpoint/2015/main" val="1"/>
+              </p:ext>
+            </p:extLst>
+          </p:nvPr>
+        </p:nvSpPr>
+        <p:spPr>
+          <a:xfrm>
+            <a:off x="5297762" y="2374947"/>
+            <a:ext cx="4243589" cy="18288"/>
+          </a:xfrm>
+          <a:custGeom>
+            <a:avLst/>
+            <a:gdLst>
+              <a:gd name="connsiteX0" fmla="*/ 0 w 4243589"/>
+              <a:gd name="connsiteY0" fmla="*/ 0 h 18288"/>
+              <a:gd name="connsiteX1" fmla="*/ 478919 w 4243589"/>
+              <a:gd name="connsiteY1" fmla="*/ 0 h 18288"/>
+              <a:gd name="connsiteX2" fmla="*/ 957839 w 4243589"/>
+              <a:gd name="connsiteY2" fmla="*/ 0 h 18288"/>
+              <a:gd name="connsiteX3" fmla="*/ 1521630 w 4243589"/>
+              <a:gd name="connsiteY3" fmla="*/ 0 h 18288"/>
+              <a:gd name="connsiteX4" fmla="*/ 2212729 w 4243589"/>
+              <a:gd name="connsiteY4" fmla="*/ 0 h 18288"/>
+              <a:gd name="connsiteX5" fmla="*/ 2734084 w 4243589"/>
+              <a:gd name="connsiteY5" fmla="*/ 0 h 18288"/>
+              <a:gd name="connsiteX6" fmla="*/ 3255439 w 4243589"/>
+              <a:gd name="connsiteY6" fmla="*/ 0 h 18288"/>
+              <a:gd name="connsiteX7" fmla="*/ 4243589 w 4243589"/>
+              <a:gd name="connsiteY7" fmla="*/ 0 h 18288"/>
+              <a:gd name="connsiteX8" fmla="*/ 4243589 w 4243589"/>
+              <a:gd name="connsiteY8" fmla="*/ 18288 h 18288"/>
+              <a:gd name="connsiteX9" fmla="*/ 3594926 w 4243589"/>
+              <a:gd name="connsiteY9" fmla="*/ 18288 h 18288"/>
+              <a:gd name="connsiteX10" fmla="*/ 3073571 w 4243589"/>
+              <a:gd name="connsiteY10" fmla="*/ 18288 h 18288"/>
+              <a:gd name="connsiteX11" fmla="*/ 2552216 w 4243589"/>
+              <a:gd name="connsiteY11" fmla="*/ 18288 h 18288"/>
+              <a:gd name="connsiteX12" fmla="*/ 1903553 w 4243589"/>
+              <a:gd name="connsiteY12" fmla="*/ 18288 h 18288"/>
+              <a:gd name="connsiteX13" fmla="*/ 1212454 w 4243589"/>
+              <a:gd name="connsiteY13" fmla="*/ 18288 h 18288"/>
+              <a:gd name="connsiteX14" fmla="*/ 733535 w 4243589"/>
+              <a:gd name="connsiteY14" fmla="*/ 18288 h 18288"/>
+              <a:gd name="connsiteX15" fmla="*/ 0 w 4243589"/>
+              <a:gd name="connsiteY15" fmla="*/ 18288 h 18288"/>
+              <a:gd name="connsiteX16" fmla="*/ 0 w 4243589"/>
+              <a:gd name="connsiteY16" fmla="*/ 0 h 18288"/>
+            </a:gdLst>
+            <a:ahLst/>
+            <a:cxnLst>
+              <a:cxn ang="0">
+                <a:pos x="connsiteX0" y="connsiteY0"/>
+              </a:cxn>
+              <a:cxn ang="0">
+                <a:pos x="connsiteX1" y="connsiteY1"/>
+              </a:cxn>
+              <a:cxn ang="0">
+                <a:pos x="connsiteX2" y="connsiteY2"/>
+              </a:cxn>
+              <a:cxn ang="0">
+                <a:pos x="connsiteX3" y="connsiteY3"/>
+              </a:cxn>
+              <a:cxn ang="0">
+                <a:pos x="connsiteX4" y="connsiteY4"/>
+              </a:cxn>
+              <a:cxn ang="0">
+                <a:pos x="connsiteX5" y="connsiteY5"/>
+              </a:cxn>
+              <a:cxn ang="0">
+                <a:pos x="connsiteX6" y="connsiteY6"/>
+              </a:cxn>
+              <a:cxn ang="0">
+                <a:pos x="connsiteX7" y="connsiteY7"/>
+              </a:cxn>
+              <a:cxn ang="0">
+                <a:pos x="connsiteX8" y="connsiteY8"/>
+              </a:cxn>
+              <a:cxn ang="0">
+                <a:pos x="connsiteX9" y="connsiteY9"/>
+              </a:cxn>
+              <a:cxn ang="0">
+                <a:pos x="connsiteX10" y="connsiteY10"/>
+              </a:cxn>
+              <a:cxn ang="0">
+                <a:pos x="connsiteX11" y="connsiteY11"/>
+              </a:cxn>
+              <a:cxn ang="0">
+                <a:pos x="connsiteX12" y="connsiteY12"/>
+              </a:cxn>
+              <a:cxn ang="0">
+                <a:pos x="connsiteX13" y="connsiteY13"/>
+              </a:cxn>
+              <a:cxn ang="0">
+                <a:pos x="connsiteX14" y="connsiteY14"/>
+              </a:cxn>
+              <a:cxn ang="0">
+                <a:pos x="connsiteX15" y="connsiteY15"/>
+              </a:cxn>
+              <a:cxn ang="0">
+                <a:pos x="connsiteX16" y="connsiteY16"/>
+              </a:cxn>
+            </a:cxnLst>
+            <a:rect l="l" t="t" r="r" b="b"/>
+            <a:pathLst>
+              <a:path w="4243589" h="18288" fill="none" extrusionOk="0">
+                <a:moveTo>
+                  <a:pt x="0" y="0"/>
+                </a:moveTo>
+                <a:cubicBezTo>
+                  <a:pt x="213395" y="-21006"/>
+                  <a:pt x="307421" y="-18116"/>
+                  <a:pt x="478919" y="0"/>
+                </a:cubicBezTo>
+                <a:cubicBezTo>
+                  <a:pt x="650417" y="18116"/>
+                  <a:pt x="831092" y="-21237"/>
+                  <a:pt x="957839" y="0"/>
+                </a:cubicBezTo>
+                <a:cubicBezTo>
+                  <a:pt x="1084586" y="21237"/>
+                  <a:pt x="1301682" y="25124"/>
+                  <a:pt x="1521630" y="0"/>
+                </a:cubicBezTo>
+                <a:cubicBezTo>
+                  <a:pt x="1741578" y="-25124"/>
+                  <a:pt x="1970269" y="-29139"/>
+                  <a:pt x="2212729" y="0"/>
+                </a:cubicBezTo>
+                <a:cubicBezTo>
+                  <a:pt x="2455189" y="29139"/>
+                  <a:pt x="2558847" y="-4796"/>
+                  <a:pt x="2734084" y="0"/>
+                </a:cubicBezTo>
+                <a:cubicBezTo>
+                  <a:pt x="2909321" y="4796"/>
+                  <a:pt x="3097217" y="-13409"/>
+                  <a:pt x="3255439" y="0"/>
+                </a:cubicBezTo>
+                <a:cubicBezTo>
+                  <a:pt x="3413662" y="13409"/>
+                  <a:pt x="3979999" y="-10121"/>
+                  <a:pt x="4243589" y="0"/>
+                </a:cubicBezTo>
+                <a:cubicBezTo>
+                  <a:pt x="4244484" y="8974"/>
+                  <a:pt x="4243043" y="9359"/>
+                  <a:pt x="4243589" y="18288"/>
+                </a:cubicBezTo>
+                <a:cubicBezTo>
+                  <a:pt x="4058777" y="31246"/>
+                  <a:pt x="3910348" y="3158"/>
+                  <a:pt x="3594926" y="18288"/>
+                </a:cubicBezTo>
+                <a:cubicBezTo>
+                  <a:pt x="3279504" y="33418"/>
+                  <a:pt x="3319955" y="-3977"/>
+                  <a:pt x="3073571" y="18288"/>
+                </a:cubicBezTo>
+                <a:cubicBezTo>
+                  <a:pt x="2827187" y="40553"/>
+                  <a:pt x="2767387" y="1863"/>
+                  <a:pt x="2552216" y="18288"/>
+                </a:cubicBezTo>
+                <a:cubicBezTo>
+                  <a:pt x="2337046" y="34713"/>
+                  <a:pt x="2181871" y="19527"/>
+                  <a:pt x="1903553" y="18288"/>
+                </a:cubicBezTo>
+                <a:cubicBezTo>
+                  <a:pt x="1625235" y="17049"/>
+                  <a:pt x="1557672" y="24174"/>
+                  <a:pt x="1212454" y="18288"/>
+                </a:cubicBezTo>
+                <a:cubicBezTo>
+                  <a:pt x="867236" y="12402"/>
+                  <a:pt x="874382" y="15627"/>
+                  <a:pt x="733535" y="18288"/>
+                </a:cubicBezTo>
+                <a:cubicBezTo>
+                  <a:pt x="592688" y="20949"/>
+                  <a:pt x="183477" y="14753"/>
+                  <a:pt x="0" y="18288"/>
+                </a:cubicBezTo>
+                <a:cubicBezTo>
+                  <a:pt x="-229" y="14222"/>
+                  <a:pt x="509" y="5816"/>
+                  <a:pt x="0" y="0"/>
+                </a:cubicBezTo>
+                <a:close/>
+              </a:path>
+              <a:path w="4243589" h="18288" stroke="0" extrusionOk="0">
+                <a:moveTo>
+                  <a:pt x="0" y="0"/>
+                </a:moveTo>
+                <a:cubicBezTo>
+                  <a:pt x="143690" y="16630"/>
+                  <a:pt x="266667" y="14847"/>
+                  <a:pt x="521355" y="0"/>
+                </a:cubicBezTo>
+                <a:cubicBezTo>
+                  <a:pt x="776043" y="-14847"/>
+                  <a:pt x="814491" y="-17363"/>
+                  <a:pt x="1000275" y="0"/>
+                </a:cubicBezTo>
+                <a:cubicBezTo>
+                  <a:pt x="1186059" y="17363"/>
+                  <a:pt x="1352504" y="-23507"/>
+                  <a:pt x="1521630" y="0"/>
+                </a:cubicBezTo>
+                <a:cubicBezTo>
+                  <a:pt x="1690756" y="23507"/>
+                  <a:pt x="1889525" y="5871"/>
+                  <a:pt x="2127857" y="0"/>
+                </a:cubicBezTo>
+                <a:cubicBezTo>
+                  <a:pt x="2366189" y="-5871"/>
+                  <a:pt x="2620628" y="-27997"/>
+                  <a:pt x="2776520" y="0"/>
+                </a:cubicBezTo>
+                <a:cubicBezTo>
+                  <a:pt x="2932412" y="27997"/>
+                  <a:pt x="3131683" y="-25073"/>
+                  <a:pt x="3467618" y="0"/>
+                </a:cubicBezTo>
+                <a:cubicBezTo>
+                  <a:pt x="3803553" y="25073"/>
+                  <a:pt x="4017371" y="3071"/>
+                  <a:pt x="4243589" y="0"/>
+                </a:cubicBezTo>
+                <a:cubicBezTo>
+                  <a:pt x="4243134" y="6162"/>
+                  <a:pt x="4243492" y="11775"/>
+                  <a:pt x="4243589" y="18288"/>
+                </a:cubicBezTo>
+                <a:cubicBezTo>
+                  <a:pt x="4017834" y="-5779"/>
+                  <a:pt x="3834586" y="13376"/>
+                  <a:pt x="3594926" y="18288"/>
+                </a:cubicBezTo>
+                <a:cubicBezTo>
+                  <a:pt x="3355266" y="23200"/>
+                  <a:pt x="3204179" y="2869"/>
+                  <a:pt x="2903827" y="18288"/>
+                </a:cubicBezTo>
+                <a:cubicBezTo>
+                  <a:pt x="2603475" y="33707"/>
+                  <a:pt x="2526187" y="46187"/>
+                  <a:pt x="2212729" y="18288"/>
+                </a:cubicBezTo>
+                <a:cubicBezTo>
+                  <a:pt x="1899271" y="-9611"/>
+                  <a:pt x="1966289" y="29692"/>
+                  <a:pt x="1733809" y="18288"/>
+                </a:cubicBezTo>
+                <a:cubicBezTo>
+                  <a:pt x="1501329" y="6884"/>
+                  <a:pt x="1343612" y="12492"/>
+                  <a:pt x="1085146" y="18288"/>
+                </a:cubicBezTo>
+                <a:cubicBezTo>
+                  <a:pt x="826680" y="24084"/>
+                  <a:pt x="778184" y="35607"/>
+                  <a:pt x="521355" y="18288"/>
+                </a:cubicBezTo>
+                <a:cubicBezTo>
+                  <a:pt x="264526" y="969"/>
+                  <a:pt x="120277" y="4268"/>
+                  <a:pt x="0" y="18288"/>
+                </a:cubicBezTo>
+                <a:cubicBezTo>
+                  <a:pt x="766" y="10800"/>
+                  <a:pt x="-457" y="8180"/>
+                  <a:pt x="0" y="0"/>
+                </a:cubicBezTo>
+                <a:close/>
+              </a:path>
+            </a:pathLst>
+          </a:custGeom>
+          <a:solidFill>
+            <a:schemeClr val="accent2"/>
+          </a:solidFill>
+          <a:ln w="44450" cap="rnd">
+            <a:solidFill>
+              <a:schemeClr val="accent2"/>
+            </a:solidFill>
+            <a:round/>
+            <a:extLst>
+              <a:ext uri="{C807C97D-BFC1-408E-A445-0C87EB9F89A2}">
+                <ask:lineSketchStyleProps xmlns:ask="http://schemas.microsoft.com/office/drawing/2018/sketchyshapes" sd="2727557108">
+                  <a:prstGeom prst="rect">
+                    <a:avLst/>
+                  </a:prstGeom>
+                  <ask:type>
+                    <ask:lineSketchFreehand/>
+                  </ask:type>
+                </ask:lineSketchStyleProps>
+              </a:ext>
+            </a:extLst>
+          </a:ln>
+        </p:spPr>
+        <p:style>
+          <a:lnRef idx="2">
+            <a:schemeClr val="accent1">
+              <a:shade val="50000"/>
+            </a:schemeClr>
+          </a:lnRef>
+          <a:fillRef idx="1">
+            <a:schemeClr val="accent1"/>
+          </a:fillRef>
+          <a:effectRef idx="0">
+            <a:schemeClr val="accent1"/>
+          </a:effectRef>
+          <a:fontRef idx="minor">
+            <a:schemeClr val="lt1"/>
+          </a:fontRef>
+        </p:style>
+        <p:txBody>
+          <a:bodyPr rtlCol="0" anchor="ctr"/>
+          <a:lstStyle/>
+          <a:p>
+            <a:pPr algn="ctr"/>
+            <a:endParaRPr lang="en-US"/>
+          </a:p>
+        </p:txBody>
+      </p:sp>
+      <p:sp>
+        <p:nvSpPr>
+          <p:cNvPr id="7" name="TextBox 6">
+            <a:extLst>
+              <a:ext uri="{FF2B5EF4-FFF2-40B4-BE49-F238E27FC236}">
+                <a16:creationId xmlns:a16="http://schemas.microsoft.com/office/drawing/2014/main" id="{72671763-3E0C-4615-B2E6-B6241DFC68B4}"/>
+              </a:ext>
+            </a:extLst>
+          </p:cNvPr>
+          <p:cNvSpPr txBox="1"/>
+          <p:nvPr/>
+        </p:nvSpPr>
+        <p:spPr>
+          <a:xfrm>
+            <a:off x="5297762" y="2706624"/>
+            <a:ext cx="6251110" cy="3483864"/>
           </a:xfrm>
           <a:prstGeom prst="rect">
             <a:avLst/>
           </a:prstGeom>
         </p:spPr>
-      </p:pic>
-      <p:pic>
-        <p:nvPicPr>
-          <p:cNvPr id="8" name="Picture 7">
-            <a:extLst>
-              <a:ext uri="{FF2B5EF4-FFF2-40B4-BE49-F238E27FC236}">
-                <a16:creationId xmlns:a16="http://schemas.microsoft.com/office/drawing/2014/main" id="{92BBB1AC-3D77-48A2-B5B7-8CC4986DED1B}"/>
-              </a:ext>
-            </a:extLst>
-          </p:cNvPr>
-          <p:cNvPicPr>
-            <a:picLocks noChangeAspect="1"/>
-          </p:cNvPicPr>
-          <p:nvPr/>
-        </p:nvPicPr>
-        <p:blipFill>
-          <a:blip r:embed="rId3"/>
-          <a:stretch>
-            <a:fillRect/>
-          </a:stretch>
-        </p:blipFill>
-        <p:spPr>
-          <a:xfrm>
-            <a:off x="3580247" y="723900"/>
-            <a:ext cx="2339760" cy="4672452"/>
-          </a:xfrm>
-          <a:prstGeom prst="rect">
-            <a:avLst/>
-          </a:prstGeom>
-        </p:spPr>
-      </p:pic>
-      <p:pic>
-        <p:nvPicPr>
-          <p:cNvPr id="10" name="Picture 9">
-            <a:extLst>
-              <a:ext uri="{FF2B5EF4-FFF2-40B4-BE49-F238E27FC236}">
-                <a16:creationId xmlns:a16="http://schemas.microsoft.com/office/drawing/2014/main" id="{22DBEAD2-BA06-4C41-A628-458941CA4F19}"/>
-              </a:ext>
-            </a:extLst>
-          </p:cNvPr>
-          <p:cNvPicPr>
-            <a:picLocks noChangeAspect="1"/>
-          </p:cNvPicPr>
-          <p:nvPr/>
-        </p:nvPicPr>
-        <p:blipFill>
-          <a:blip r:embed="rId4"/>
-          <a:stretch>
-            <a:fillRect/>
-          </a:stretch>
-        </p:blipFill>
-        <p:spPr>
-          <a:xfrm>
-            <a:off x="6271994" y="723900"/>
-            <a:ext cx="2129055" cy="4803850"/>
-          </a:xfrm>
-          <a:prstGeom prst="rect">
-            <a:avLst/>
-          </a:prstGeom>
-        </p:spPr>
-      </p:pic>
+        <p:txBody>
+          <a:bodyPr vert="horz" lIns="91440" tIns="45720" rIns="91440" bIns="45720" rtlCol="0">
+            <a:normAutofit/>
+          </a:bodyPr>
+          <a:lstStyle/>
+          <a:p>
+            <a:pPr marL="514350" indent="-228600">
+              <a:lnSpc>
+                <a:spcPct val="90000"/>
+              </a:lnSpc>
+              <a:spcAft>
+                <a:spcPts val="600"/>
+              </a:spcAft>
+              <a:buFont typeface="Arial" panose="020B0604020202020204" pitchFamily="34" charset="0"/>
+              <a:buChar char="•"/>
+            </a:pPr>
+            <a:r>
+              <a:rPr lang="en-US" sz="1500"/>
+              <a:t>Get value from api</a:t>
+            </a:r>
+          </a:p>
+          <a:p>
+            <a:pPr marL="514350" indent="-228600">
+              <a:lnSpc>
+                <a:spcPct val="90000"/>
+              </a:lnSpc>
+              <a:spcAft>
+                <a:spcPts val="600"/>
+              </a:spcAft>
+              <a:buFont typeface="Arial" panose="020B0604020202020204" pitchFamily="34" charset="0"/>
+              <a:buChar char="•"/>
+            </a:pPr>
+            <a:r>
+              <a:rPr lang="en-US" sz="1500"/>
+              <a:t>Check 200 </a:t>
+            </a:r>
+          </a:p>
+          <a:p>
+            <a:pPr marL="514350" indent="-228600">
+              <a:lnSpc>
+                <a:spcPct val="90000"/>
+              </a:lnSpc>
+              <a:spcAft>
+                <a:spcPts val="600"/>
+              </a:spcAft>
+              <a:buFont typeface="Arial" panose="020B0604020202020204" pitchFamily="34" charset="0"/>
+              <a:buChar char="•"/>
+            </a:pPr>
+            <a:r>
+              <a:rPr lang="en-US" sz="1500"/>
+              <a:t>Function get data from api</a:t>
+            </a:r>
+          </a:p>
+          <a:p>
+            <a:pPr marL="514350" indent="-228600">
+              <a:lnSpc>
+                <a:spcPct val="90000"/>
+              </a:lnSpc>
+              <a:spcAft>
+                <a:spcPts val="600"/>
+              </a:spcAft>
+              <a:buFont typeface="Arial" panose="020B0604020202020204" pitchFamily="34" charset="0"/>
+              <a:buChar char="•"/>
+            </a:pPr>
+            <a:r>
+              <a:rPr lang="en-US" sz="1500"/>
+              <a:t>Model of output data</a:t>
+            </a:r>
+          </a:p>
+          <a:p>
+            <a:pPr marL="514350" indent="-228600">
+              <a:lnSpc>
+                <a:spcPct val="90000"/>
+              </a:lnSpc>
+              <a:spcAft>
+                <a:spcPts val="600"/>
+              </a:spcAft>
+              <a:buFont typeface="Arial" panose="020B0604020202020204" pitchFamily="34" charset="0"/>
+              <a:buChar char="•"/>
+            </a:pPr>
+            <a:r>
+              <a:rPr lang="en-US" sz="1500"/>
+              <a:t>List of data (many records)</a:t>
+            </a:r>
+          </a:p>
+          <a:p>
+            <a:pPr marL="514350" indent="-228600">
+              <a:lnSpc>
+                <a:spcPct val="90000"/>
+              </a:lnSpc>
+              <a:spcAft>
+                <a:spcPts val="600"/>
+              </a:spcAft>
+              <a:buFont typeface="Arial" panose="020B0604020202020204" pitchFamily="34" charset="0"/>
+              <a:buChar char="•"/>
+            </a:pPr>
+            <a:r>
+              <a:rPr lang="en-US" sz="1500"/>
+              <a:t>Future Builder</a:t>
+            </a:r>
+          </a:p>
+          <a:p>
+            <a:pPr marL="514350" indent="-228600">
+              <a:lnSpc>
+                <a:spcPct val="90000"/>
+              </a:lnSpc>
+              <a:spcAft>
+                <a:spcPts val="600"/>
+              </a:spcAft>
+              <a:buFont typeface="Arial" panose="020B0604020202020204" pitchFamily="34" charset="0"/>
+              <a:buChar char="•"/>
+            </a:pPr>
+            <a:r>
+              <a:rPr lang="en-US" sz="1500"/>
+              <a:t>Hasdata (show data, no: loading)</a:t>
+            </a:r>
+          </a:p>
+          <a:p>
+            <a:pPr marL="514350" indent="-228600">
+              <a:lnSpc>
+                <a:spcPct val="90000"/>
+              </a:lnSpc>
+              <a:spcAft>
+                <a:spcPts val="600"/>
+              </a:spcAft>
+              <a:buFont typeface="Arial" panose="020B0604020202020204" pitchFamily="34" charset="0"/>
+              <a:buChar char="•"/>
+            </a:pPr>
+            <a:r>
+              <a:rPr lang="en-US" sz="1500"/>
+              <a:t>Singlechild scrollview</a:t>
+            </a:r>
+          </a:p>
+          <a:p>
+            <a:pPr marL="514350" indent="-228600">
+              <a:lnSpc>
+                <a:spcPct val="90000"/>
+              </a:lnSpc>
+              <a:spcAft>
+                <a:spcPts val="600"/>
+              </a:spcAft>
+              <a:buFont typeface="Arial" panose="020B0604020202020204" pitchFamily="34" charset="0"/>
+              <a:buChar char="•"/>
+            </a:pPr>
+            <a:r>
+              <a:rPr lang="en-US" sz="1500"/>
+              <a:t>Singlechild scrollview</a:t>
+            </a:r>
+          </a:p>
+          <a:p>
+            <a:pPr marL="514350" indent="-228600">
+              <a:lnSpc>
+                <a:spcPct val="90000"/>
+              </a:lnSpc>
+              <a:spcAft>
+                <a:spcPts val="600"/>
+              </a:spcAft>
+              <a:buFont typeface="Arial" panose="020B0604020202020204" pitchFamily="34" charset="0"/>
+              <a:buChar char="•"/>
+            </a:pPr>
+            <a:r>
+              <a:rPr lang="en-US" sz="1500"/>
+              <a:t>Datatable </a:t>
+            </a:r>
+          </a:p>
+          <a:p>
+            <a:pPr marL="971550" lvl="1" indent="-228600">
+              <a:lnSpc>
+                <a:spcPct val="90000"/>
+              </a:lnSpc>
+              <a:spcAft>
+                <a:spcPts val="600"/>
+              </a:spcAft>
+              <a:buFont typeface="Arial" panose="020B0604020202020204" pitchFamily="34" charset="0"/>
+              <a:buChar char="•"/>
+            </a:pPr>
+            <a:r>
+              <a:rPr lang="en-US" sz="1500"/>
+              <a:t>Column</a:t>
+            </a:r>
+          </a:p>
+          <a:p>
+            <a:pPr marL="971550" lvl="1" indent="-228600">
+              <a:lnSpc>
+                <a:spcPct val="90000"/>
+              </a:lnSpc>
+              <a:spcAft>
+                <a:spcPts val="600"/>
+              </a:spcAft>
+              <a:buFont typeface="Arial" panose="020B0604020202020204" pitchFamily="34" charset="0"/>
+              <a:buChar char="•"/>
+            </a:pPr>
+            <a:r>
+              <a:rPr lang="en-US" sz="1500"/>
+              <a:t>Row : map data</a:t>
+            </a:r>
+          </a:p>
+        </p:txBody>
+      </p:sp>
     </p:spTree>
     <p:extLst>
       <p:ext uri="{BB962C8B-B14F-4D97-AF65-F5344CB8AC3E}">
-        <p14:creationId xmlns:p14="http://schemas.microsoft.com/office/powerpoint/2010/main" val="436143495"/>
+        <p14:creationId xmlns:p14="http://schemas.microsoft.com/office/powerpoint/2010/main" val="3929565091"/>
       </p:ext>
     </p:extLst>
   </p:cSld>

</xml_diff>